<commit_message>
Add data | Update workshop notebook with keras error snapshots
</commit_message>
<xml_diff>
--- a/Machine_Learning_Deep_Learning/props/Theme_Workflow.pptx
+++ b/Machine_Learning_Deep_Learning/props/Theme_Workflow.pptx
@@ -104,6 +104,11 @@
       </a:defRPr>
     </a:lvl9pPr>
   </p:defaultTextStyle>
+  <p:extLst>
+    <p:ext uri="{EFAFB233-063F-42B5-8137-9DF3F51BA10A}">
+      <p15:sldGuideLst xmlns:p15="http://schemas.microsoft.com/office/powerpoint/2012/main"/>
+    </p:ext>
+  </p:extLst>
 </p:presentation>
 </file>
 
@@ -254,7 +259,7 @@
           <a:p>
             <a:fld id="{7CD872FC-982C-484D-AA85-C04831204B6D}" type="datetimeFigureOut">
               <a:rPr lang="en-US" smtClean="0"/>
-              <a:t>7/14/2019</a:t>
+              <a:t>7/15/2019</a:t>
             </a:fld>
             <a:endParaRPr lang="en-US"/>
           </a:p>
@@ -452,7 +457,7 @@
           <a:p>
             <a:fld id="{7CD872FC-982C-484D-AA85-C04831204B6D}" type="datetimeFigureOut">
               <a:rPr lang="en-US" smtClean="0"/>
-              <a:t>7/14/2019</a:t>
+              <a:t>7/15/2019</a:t>
             </a:fld>
             <a:endParaRPr lang="en-US"/>
           </a:p>
@@ -660,7 +665,7 @@
           <a:p>
             <a:fld id="{7CD872FC-982C-484D-AA85-C04831204B6D}" type="datetimeFigureOut">
               <a:rPr lang="en-US" smtClean="0"/>
-              <a:t>7/14/2019</a:t>
+              <a:t>7/15/2019</a:t>
             </a:fld>
             <a:endParaRPr lang="en-US"/>
           </a:p>
@@ -858,7 +863,7 @@
           <a:p>
             <a:fld id="{7CD872FC-982C-484D-AA85-C04831204B6D}" type="datetimeFigureOut">
               <a:rPr lang="en-US" smtClean="0"/>
-              <a:t>7/14/2019</a:t>
+              <a:t>7/15/2019</a:t>
             </a:fld>
             <a:endParaRPr lang="en-US"/>
           </a:p>
@@ -1133,7 +1138,7 @@
           <a:p>
             <a:fld id="{7CD872FC-982C-484D-AA85-C04831204B6D}" type="datetimeFigureOut">
               <a:rPr lang="en-US" smtClean="0"/>
-              <a:t>7/14/2019</a:t>
+              <a:t>7/15/2019</a:t>
             </a:fld>
             <a:endParaRPr lang="en-US"/>
           </a:p>
@@ -1398,7 +1403,7 @@
           <a:p>
             <a:fld id="{7CD872FC-982C-484D-AA85-C04831204B6D}" type="datetimeFigureOut">
               <a:rPr lang="en-US" smtClean="0"/>
-              <a:t>7/14/2019</a:t>
+              <a:t>7/15/2019</a:t>
             </a:fld>
             <a:endParaRPr lang="en-US"/>
           </a:p>
@@ -1810,7 +1815,7 @@
           <a:p>
             <a:fld id="{7CD872FC-982C-484D-AA85-C04831204B6D}" type="datetimeFigureOut">
               <a:rPr lang="en-US" smtClean="0"/>
-              <a:t>7/14/2019</a:t>
+              <a:t>7/15/2019</a:t>
             </a:fld>
             <a:endParaRPr lang="en-US"/>
           </a:p>
@@ -1951,7 +1956,7 @@
           <a:p>
             <a:fld id="{7CD872FC-982C-484D-AA85-C04831204B6D}" type="datetimeFigureOut">
               <a:rPr lang="en-US" smtClean="0"/>
-              <a:t>7/14/2019</a:t>
+              <a:t>7/15/2019</a:t>
             </a:fld>
             <a:endParaRPr lang="en-US"/>
           </a:p>
@@ -2064,7 +2069,7 @@
           <a:p>
             <a:fld id="{7CD872FC-982C-484D-AA85-C04831204B6D}" type="datetimeFigureOut">
               <a:rPr lang="en-US" smtClean="0"/>
-              <a:t>7/14/2019</a:t>
+              <a:t>7/15/2019</a:t>
             </a:fld>
             <a:endParaRPr lang="en-US"/>
           </a:p>
@@ -2375,7 +2380,7 @@
           <a:p>
             <a:fld id="{7CD872FC-982C-484D-AA85-C04831204B6D}" type="datetimeFigureOut">
               <a:rPr lang="en-US" smtClean="0"/>
-              <a:t>7/14/2019</a:t>
+              <a:t>7/15/2019</a:t>
             </a:fld>
             <a:endParaRPr lang="en-US"/>
           </a:p>
@@ -2663,7 +2668,7 @@
           <a:p>
             <a:fld id="{7CD872FC-982C-484D-AA85-C04831204B6D}" type="datetimeFigureOut">
               <a:rPr lang="en-US" smtClean="0"/>
-              <a:t>7/14/2019</a:t>
+              <a:t>7/15/2019</a:t>
             </a:fld>
             <a:endParaRPr lang="en-US"/>
           </a:p>
@@ -2904,7 +2909,7 @@
           <a:p>
             <a:fld id="{7CD872FC-982C-484D-AA85-C04831204B6D}" type="datetimeFigureOut">
               <a:rPr lang="en-US" smtClean="0"/>
-              <a:t>7/14/2019</a:t>
+              <a:t>7/15/2019</a:t>
             </a:fld>
             <a:endParaRPr lang="en-US"/>
           </a:p>
@@ -3357,9 +3362,9 @@
           <a:stretch/>
         </p:blipFill>
         <p:spPr>
-          <a:xfrm rot="5400000">
-            <a:off x="-75819" y="2677343"/>
-            <a:ext cx="1820329" cy="1365246"/>
+          <a:xfrm>
+            <a:off x="44789" y="2744030"/>
+            <a:ext cx="1820329" cy="1207841"/>
           </a:xfrm>
         </p:spPr>
       </p:pic>
@@ -3399,8 +3404,8 @@
           </a:prstGeom>
         </p:spPr>
       </p:pic>
-      <mc:AlternateContent xmlns:mc="http://schemas.openxmlformats.org/markup-compatibility/2006">
-        <mc:Choice xmlns:a14="http://schemas.microsoft.com/office/drawing/2010/main" Requires="a14">
+      <mc:AlternateContent xmlns:mc="http://schemas.openxmlformats.org/markup-compatibility/2006" xmlns:a14="http://schemas.microsoft.com/office/drawing/2010/main">
+        <mc:Choice Requires="a14">
           <p:sp>
             <p:nvSpPr>
               <p:cNvPr id="19" name="TextBox 18">
@@ -3429,6 +3434,7 @@
               </a:bodyPr>
               <a:lstStyle/>
               <a:p>
+                <a:pPr/>
                 <a14:m>
                   <m:oMathPara xmlns:m="http://schemas.openxmlformats.org/officeDocument/2006/math">
                     <m:oMathParaPr>
@@ -3460,7 +3466,13 @@
                               <a:rPr lang="en-US" b="0" i="1" smtClean="0">
                                 <a:latin typeface="Cambria Math" panose="02040503050406030204" pitchFamily="18" charset="0"/>
                               </a:rPr>
-                              <m:t>165</m:t>
+                              <m:t>1</m:t>
+                            </m:r>
+                            <m:r>
+                              <a:rPr lang="en-US" b="0" i="1" smtClean="0">
+                                <a:latin typeface="Cambria Math" panose="02040503050406030204" pitchFamily="18" charset="0"/>
+                              </a:rPr>
+                              <m:t>65</m:t>
                             </m:r>
                           </m:e>
                         </m:mr>
@@ -3493,7 +3505,7 @@
             </p:txBody>
           </p:sp>
         </mc:Choice>
-        <mc:Fallback>
+        <mc:Fallback xmlns="">
           <p:sp>
             <p:nvSpPr>
               <p:cNvPr id="19" name="TextBox 18">
@@ -3538,8 +3550,8 @@
           </p:sp>
         </mc:Fallback>
       </mc:AlternateContent>
-      <mc:AlternateContent xmlns:mc="http://schemas.openxmlformats.org/markup-compatibility/2006">
-        <mc:Choice xmlns:a14="http://schemas.microsoft.com/office/drawing/2010/main" Requires="a14">
+      <mc:AlternateContent xmlns:mc="http://schemas.openxmlformats.org/markup-compatibility/2006" xmlns:a14="http://schemas.microsoft.com/office/drawing/2010/main">
+        <mc:Choice Requires="a14">
           <p:sp>
             <p:nvSpPr>
               <p:cNvPr id="20" name="TextBox 19">
@@ -3568,6 +3580,7 @@
               </a:bodyPr>
               <a:lstStyle/>
               <a:p>
+                <a:pPr/>
                 <a14:m>
                   <m:oMathPara xmlns:m="http://schemas.openxmlformats.org/officeDocument/2006/math">
                     <m:oMathParaPr>
@@ -3599,7 +3612,13 @@
                               <a:rPr lang="en-US" b="0" i="1" smtClean="0">
                                 <a:latin typeface="Cambria Math" panose="02040503050406030204" pitchFamily="18" charset="0"/>
                               </a:rPr>
-                              <m:t>14</m:t>
+                              <m:t>1</m:t>
+                            </m:r>
+                            <m:r>
+                              <a:rPr lang="en-US" b="0" i="1" smtClean="0">
+                                <a:latin typeface="Cambria Math" panose="02040503050406030204" pitchFamily="18" charset="0"/>
+                              </a:rPr>
+                              <m:t>4</m:t>
                             </m:r>
                           </m:e>
                         </m:mr>
@@ -3632,7 +3651,7 @@
             </p:txBody>
           </p:sp>
         </mc:Choice>
-        <mc:Fallback>
+        <mc:Fallback xmlns="">
           <p:sp>
             <p:nvSpPr>
               <p:cNvPr id="20" name="TextBox 19">
@@ -3677,8 +3696,8 @@
           </p:sp>
         </mc:Fallback>
       </mc:AlternateContent>
-      <mc:AlternateContent xmlns:mc="http://schemas.openxmlformats.org/markup-compatibility/2006">
-        <mc:Choice xmlns:a14="http://schemas.microsoft.com/office/drawing/2010/main" Requires="a14">
+      <mc:AlternateContent xmlns:mc="http://schemas.openxmlformats.org/markup-compatibility/2006" xmlns:a14="http://schemas.microsoft.com/office/drawing/2010/main">
+        <mc:Choice Requires="a14">
           <p:sp>
             <p:nvSpPr>
               <p:cNvPr id="21" name="TextBox 20">
@@ -3707,6 +3726,7 @@
               </a:bodyPr>
               <a:lstStyle/>
               <a:p>
+                <a:pPr/>
                 <a14:m>
                   <m:oMathPara xmlns:m="http://schemas.openxmlformats.org/officeDocument/2006/math">
                     <m:oMathParaPr>
@@ -3738,7 +3758,13 @@
                               <a:rPr lang="en-US" b="0" i="1" smtClean="0">
                                 <a:latin typeface="Cambria Math" panose="02040503050406030204" pitchFamily="18" charset="0"/>
                               </a:rPr>
-                              <m:t>253</m:t>
+                              <m:t>2</m:t>
+                            </m:r>
+                            <m:r>
+                              <a:rPr lang="en-US" b="0" i="1" smtClean="0">
+                                <a:latin typeface="Cambria Math" panose="02040503050406030204" pitchFamily="18" charset="0"/>
+                              </a:rPr>
+                              <m:t>53</m:t>
                             </m:r>
                           </m:e>
                         </m:mr>
@@ -3771,7 +3797,7 @@
             </p:txBody>
           </p:sp>
         </mc:Choice>
-        <mc:Fallback>
+        <mc:Fallback xmlns="">
           <p:sp>
             <p:nvSpPr>
               <p:cNvPr id="21" name="TextBox 20">
@@ -3816,8 +3842,8 @@
           </p:sp>
         </mc:Fallback>
       </mc:AlternateContent>
-      <mc:AlternateContent xmlns:mc="http://schemas.openxmlformats.org/markup-compatibility/2006">
-        <mc:Choice xmlns:a14="http://schemas.microsoft.com/office/drawing/2010/main" Requires="a14">
+      <mc:AlternateContent xmlns:mc="http://schemas.openxmlformats.org/markup-compatibility/2006" xmlns:a14="http://schemas.microsoft.com/office/drawing/2010/main">
+        <mc:Choice Requires="a14">
           <p:sp>
             <p:nvSpPr>
               <p:cNvPr id="22" name="TextBox 21">
@@ -3846,6 +3872,7 @@
               </a:bodyPr>
               <a:lstStyle/>
               <a:p>
+                <a:pPr/>
                 <a14:m>
                   <m:oMathPara xmlns:m="http://schemas.openxmlformats.org/officeDocument/2006/math">
                     <m:oMathParaPr>
@@ -3877,7 +3904,13 @@
                               <a:rPr lang="en-US" b="0" i="1" smtClean="0">
                                 <a:latin typeface="Cambria Math" panose="02040503050406030204" pitchFamily="18" charset="0"/>
                               </a:rPr>
-                              <m:t>251</m:t>
+                              <m:t>2</m:t>
+                            </m:r>
+                            <m:r>
+                              <a:rPr lang="en-US" b="0" i="1" smtClean="0">
+                                <a:latin typeface="Cambria Math" panose="02040503050406030204" pitchFamily="18" charset="0"/>
+                              </a:rPr>
+                              <m:t>51</m:t>
                             </m:r>
                           </m:e>
                         </m:mr>
@@ -3910,7 +3943,7 @@
             </p:txBody>
           </p:sp>
         </mc:Choice>
-        <mc:Fallback>
+        <mc:Fallback xmlns="">
           <p:sp>
             <p:nvSpPr>
               <p:cNvPr id="22" name="TextBox 21">
@@ -4235,7 +4268,7 @@
         </p:nvSpPr>
         <p:spPr>
           <a:xfrm>
-            <a:off x="1714818" y="3228148"/>
+            <a:off x="1843777" y="3228148"/>
             <a:ext cx="251791" cy="239606"/>
           </a:xfrm>
           <a:prstGeom prst="rightArrow">

</xml_diff>